<commit_message>
Add new downloadJar image
</commit_message>
<xml_diff>
--- a/docs/images/Annotated Images.pptx
+++ b/docs/images/Annotated Images.pptx
@@ -136,6 +136,11 @@
       </a:defRPr>
     </a:lvl9pPr>
   </p:defaultTextStyle>
+  <p:extLst>
+    <p:ext uri="{EFAFB233-063F-42B5-8137-9DF3F51BA10A}">
+      <p15:sldGuideLst xmlns:p15="http://schemas.microsoft.com/office/powerpoint/2012/main"/>
+    </p:ext>
+  </p:extLst>
 </p:presentation>
 </file>
 
@@ -7284,56 +7289,109 @@
           <a:chExt cx="0" cy="0"/>
         </a:xfrm>
       </p:grpSpPr>
-      <p:sp>
-        <p:nvSpPr>
-          <p:cNvPr id="2" name="Title 1">
-            <a:extLst>
-              <a:ext uri="{FF2B5EF4-FFF2-40B4-BE49-F238E27FC236}">
-                <a16:creationId xmlns:a16="http://schemas.microsoft.com/office/drawing/2014/main" id="{5AE4E888-352A-224D-B901-F3FBDE63354B}"/>
-              </a:ext>
-            </a:extLst>
-          </p:cNvPr>
-          <p:cNvSpPr>
-            <a:spLocks noGrp="1"/>
-          </p:cNvSpPr>
-          <p:nvPr>
-            <p:ph type="title"/>
-          </p:nvPr>
-        </p:nvSpPr>
-        <p:spPr/>
-        <p:txBody>
-          <a:bodyPr/>
-          <a:lstStyle/>
-          <a:p>
-            <a:endParaRPr lang="en-US"/>
-          </a:p>
-        </p:txBody>
-      </p:sp>
-      <p:sp>
-        <p:nvSpPr>
-          <p:cNvPr id="3" name="Content Placeholder 2">
-            <a:extLst>
-              <a:ext uri="{FF2B5EF4-FFF2-40B4-BE49-F238E27FC236}">
-                <a16:creationId xmlns:a16="http://schemas.microsoft.com/office/drawing/2014/main" id="{DF1A5B47-6CEC-7ABC-9C73-96B8EB13DECC}"/>
-              </a:ext>
-            </a:extLst>
-          </p:cNvPr>
-          <p:cNvSpPr>
-            <a:spLocks noGrp="1"/>
-          </p:cNvSpPr>
-          <p:nvPr>
-            <p:ph idx="1"/>
-          </p:nvPr>
-        </p:nvSpPr>
-        <p:spPr/>
-        <p:txBody>
-          <a:bodyPr/>
-          <a:lstStyle/>
-          <a:p>
-            <a:endParaRPr lang="en-US"/>
-          </a:p>
-        </p:txBody>
-      </p:sp>
+      <p:grpSp>
+        <p:nvGrpSpPr>
+          <p:cNvPr id="9" name="Group 8">
+            <a:extLst>
+              <a:ext uri="{FF2B5EF4-FFF2-40B4-BE49-F238E27FC236}">
+                <a16:creationId xmlns:a16="http://schemas.microsoft.com/office/drawing/2014/main" id="{E7C08421-755D-0C6D-19AC-7FC4C6E7B4BB}"/>
+              </a:ext>
+            </a:extLst>
+          </p:cNvPr>
+          <p:cNvGrpSpPr/>
+          <p:nvPr/>
+        </p:nvGrpSpPr>
+        <p:grpSpPr>
+          <a:xfrm>
+            <a:off x="1637678" y="51916"/>
+            <a:ext cx="8916644" cy="6754168"/>
+            <a:chOff x="1637678" y="51916"/>
+            <a:chExt cx="8916644" cy="6754168"/>
+          </a:xfrm>
+        </p:grpSpPr>
+        <p:pic>
+          <p:nvPicPr>
+            <p:cNvPr id="7" name="Picture 6">
+              <a:extLst>
+                <a:ext uri="{FF2B5EF4-FFF2-40B4-BE49-F238E27FC236}">
+                  <a16:creationId xmlns:a16="http://schemas.microsoft.com/office/drawing/2014/main" id="{882A85F8-5FF7-BA30-674A-B03C40908FFC}"/>
+                </a:ext>
+              </a:extLst>
+            </p:cNvPr>
+            <p:cNvPicPr>
+              <a:picLocks noChangeAspect="1"/>
+            </p:cNvPicPr>
+            <p:nvPr/>
+          </p:nvPicPr>
+          <p:blipFill>
+            <a:blip r:embed="rId2"/>
+            <a:stretch>
+              <a:fillRect/>
+            </a:stretch>
+          </p:blipFill>
+          <p:spPr>
+            <a:xfrm>
+              <a:off x="1637678" y="51916"/>
+              <a:ext cx="8916644" cy="6754168"/>
+            </a:xfrm>
+            <a:prstGeom prst="rect">
+              <a:avLst/>
+            </a:prstGeom>
+          </p:spPr>
+        </p:pic>
+        <p:sp>
+          <p:nvSpPr>
+            <p:cNvPr id="8" name="Rectangle 7">
+              <a:extLst>
+                <a:ext uri="{FF2B5EF4-FFF2-40B4-BE49-F238E27FC236}">
+                  <a16:creationId xmlns:a16="http://schemas.microsoft.com/office/drawing/2014/main" id="{E0E0C9D4-9A73-A7E8-7D29-4AB880B9297F}"/>
+                </a:ext>
+              </a:extLst>
+            </p:cNvPr>
+            <p:cNvSpPr/>
+            <p:nvPr/>
+          </p:nvSpPr>
+          <p:spPr>
+            <a:xfrm>
+              <a:off x="1996751" y="5141167"/>
+              <a:ext cx="8192278" cy="326573"/>
+            </a:xfrm>
+            <a:prstGeom prst="rect">
+              <a:avLst/>
+            </a:prstGeom>
+            <a:noFill/>
+            <a:ln w="28575">
+              <a:solidFill>
+                <a:srgbClr val="FF0000"/>
+              </a:solidFill>
+            </a:ln>
+          </p:spPr>
+          <p:style>
+            <a:lnRef idx="2">
+              <a:schemeClr val="accent1">
+                <a:shade val="15000"/>
+              </a:schemeClr>
+            </a:lnRef>
+            <a:fillRef idx="1">
+              <a:schemeClr val="accent1"/>
+            </a:fillRef>
+            <a:effectRef idx="0">
+              <a:schemeClr val="accent1"/>
+            </a:effectRef>
+            <a:fontRef idx="minor">
+              <a:schemeClr val="lt1"/>
+            </a:fontRef>
+          </p:style>
+          <p:txBody>
+            <a:bodyPr rtlCol="0" anchor="ctr"/>
+            <a:lstStyle/>
+            <a:p>
+              <a:pPr algn="ctr"/>
+              <a:endParaRPr lang="en-US"/>
+            </a:p>
+          </p:txBody>
+        </p:sp>
+      </p:grpSp>
     </p:spTree>
     <p:extLst>
       <p:ext uri="{BB962C8B-B14F-4D97-AF65-F5344CB8AC3E}">

</xml_diff>

<commit_message>
Add page navigation guide
</commit_message>
<xml_diff>
--- a/docs/images/Annotated Images.pptx
+++ b/docs/images/Annotated Images.pptx
@@ -291,7 +291,7 @@
           <a:p>
             <a:fld id="{3D078CF7-35B0-46C3-BDF1-01B9C0B6ABD5}" type="datetimeFigureOut">
               <a:rPr lang="en-US" smtClean="0"/>
-              <a:t>11/3/2023</a:t>
+              <a:t>11/8/2023</a:t>
             </a:fld>
             <a:endParaRPr lang="en-US"/>
           </a:p>
@@ -489,7 +489,7 @@
           <a:p>
             <a:fld id="{3D078CF7-35B0-46C3-BDF1-01B9C0B6ABD5}" type="datetimeFigureOut">
               <a:rPr lang="en-US" smtClean="0"/>
-              <a:t>11/3/2023</a:t>
+              <a:t>11/8/2023</a:t>
             </a:fld>
             <a:endParaRPr lang="en-US"/>
           </a:p>
@@ -697,7 +697,7 @@
           <a:p>
             <a:fld id="{3D078CF7-35B0-46C3-BDF1-01B9C0B6ABD5}" type="datetimeFigureOut">
               <a:rPr lang="en-US" smtClean="0"/>
-              <a:t>11/3/2023</a:t>
+              <a:t>11/8/2023</a:t>
             </a:fld>
             <a:endParaRPr lang="en-US"/>
           </a:p>
@@ -895,7 +895,7 @@
           <a:p>
             <a:fld id="{3D078CF7-35B0-46C3-BDF1-01B9C0B6ABD5}" type="datetimeFigureOut">
               <a:rPr lang="en-US" smtClean="0"/>
-              <a:t>11/3/2023</a:t>
+              <a:t>11/8/2023</a:t>
             </a:fld>
             <a:endParaRPr lang="en-US"/>
           </a:p>
@@ -1170,7 +1170,7 @@
           <a:p>
             <a:fld id="{3D078CF7-35B0-46C3-BDF1-01B9C0B6ABD5}" type="datetimeFigureOut">
               <a:rPr lang="en-US" smtClean="0"/>
-              <a:t>11/3/2023</a:t>
+              <a:t>11/8/2023</a:t>
             </a:fld>
             <a:endParaRPr lang="en-US"/>
           </a:p>
@@ -1435,7 +1435,7 @@
           <a:p>
             <a:fld id="{3D078CF7-35B0-46C3-BDF1-01B9C0B6ABD5}" type="datetimeFigureOut">
               <a:rPr lang="en-US" smtClean="0"/>
-              <a:t>11/3/2023</a:t>
+              <a:t>11/8/2023</a:t>
             </a:fld>
             <a:endParaRPr lang="en-US"/>
           </a:p>
@@ -1847,7 +1847,7 @@
           <a:p>
             <a:fld id="{3D078CF7-35B0-46C3-BDF1-01B9C0B6ABD5}" type="datetimeFigureOut">
               <a:rPr lang="en-US" smtClean="0"/>
-              <a:t>11/3/2023</a:t>
+              <a:t>11/8/2023</a:t>
             </a:fld>
             <a:endParaRPr lang="en-US"/>
           </a:p>
@@ -1988,7 +1988,7 @@
           <a:p>
             <a:fld id="{3D078CF7-35B0-46C3-BDF1-01B9C0B6ABD5}" type="datetimeFigureOut">
               <a:rPr lang="en-US" smtClean="0"/>
-              <a:t>11/3/2023</a:t>
+              <a:t>11/8/2023</a:t>
             </a:fld>
             <a:endParaRPr lang="en-US"/>
           </a:p>
@@ -2101,7 +2101,7 @@
           <a:p>
             <a:fld id="{3D078CF7-35B0-46C3-BDF1-01B9C0B6ABD5}" type="datetimeFigureOut">
               <a:rPr lang="en-US" smtClean="0"/>
-              <a:t>11/3/2023</a:t>
+              <a:t>11/8/2023</a:t>
             </a:fld>
             <a:endParaRPr lang="en-US"/>
           </a:p>
@@ -2412,7 +2412,7 @@
           <a:p>
             <a:fld id="{3D078CF7-35B0-46C3-BDF1-01B9C0B6ABD5}" type="datetimeFigureOut">
               <a:rPr lang="en-US" smtClean="0"/>
-              <a:t>11/3/2023</a:t>
+              <a:t>11/8/2023</a:t>
             </a:fld>
             <a:endParaRPr lang="en-US"/>
           </a:p>
@@ -2700,7 +2700,7 @@
           <a:p>
             <a:fld id="{3D078CF7-35B0-46C3-BDF1-01B9C0B6ABD5}" type="datetimeFigureOut">
               <a:rPr lang="en-US" smtClean="0"/>
-              <a:t>11/3/2023</a:t>
+              <a:t>11/8/2023</a:t>
             </a:fld>
             <a:endParaRPr lang="en-US"/>
           </a:p>
@@ -2941,7 +2941,7 @@
           <a:p>
             <a:fld id="{3D078CF7-35B0-46C3-BDF1-01B9C0B6ABD5}" type="datetimeFigureOut">
               <a:rPr lang="en-US" smtClean="0"/>
-              <a:t>11/3/2023</a:t>
+              <a:t>11/8/2023</a:t>
             </a:fld>
             <a:endParaRPr lang="en-US"/>
           </a:p>
@@ -7422,56 +7422,109 @@
           <a:chExt cx="0" cy="0"/>
         </a:xfrm>
       </p:grpSpPr>
-      <p:sp>
-        <p:nvSpPr>
-          <p:cNvPr id="2" name="Title 1">
-            <a:extLst>
-              <a:ext uri="{FF2B5EF4-FFF2-40B4-BE49-F238E27FC236}">
-                <a16:creationId xmlns:a16="http://schemas.microsoft.com/office/drawing/2014/main" id="{E0C6EB3E-643B-591D-2148-54DBE07860DF}"/>
-              </a:ext>
-            </a:extLst>
-          </p:cNvPr>
-          <p:cNvSpPr>
-            <a:spLocks noGrp="1"/>
-          </p:cNvSpPr>
-          <p:nvPr>
-            <p:ph type="title"/>
-          </p:nvPr>
-        </p:nvSpPr>
-        <p:spPr/>
-        <p:txBody>
-          <a:bodyPr/>
-          <a:lstStyle/>
-          <a:p>
-            <a:endParaRPr lang="en-US"/>
-          </a:p>
-        </p:txBody>
-      </p:sp>
-      <p:sp>
-        <p:nvSpPr>
-          <p:cNvPr id="3" name="Content Placeholder 2">
-            <a:extLst>
-              <a:ext uri="{FF2B5EF4-FFF2-40B4-BE49-F238E27FC236}">
-                <a16:creationId xmlns:a16="http://schemas.microsoft.com/office/drawing/2014/main" id="{E4762AB8-6A0C-CCB8-2868-9AA840DAD301}"/>
-              </a:ext>
-            </a:extLst>
-          </p:cNvPr>
-          <p:cNvSpPr>
-            <a:spLocks noGrp="1"/>
-          </p:cNvSpPr>
-          <p:nvPr>
-            <p:ph idx="1"/>
-          </p:nvPr>
-        </p:nvSpPr>
-        <p:spPr/>
-        <p:txBody>
-          <a:bodyPr/>
-          <a:lstStyle/>
-          <a:p>
-            <a:endParaRPr lang="en-US"/>
-          </a:p>
-        </p:txBody>
-      </p:sp>
+      <p:grpSp>
+        <p:nvGrpSpPr>
+          <p:cNvPr id="7" name="Group 6">
+            <a:extLst>
+              <a:ext uri="{FF2B5EF4-FFF2-40B4-BE49-F238E27FC236}">
+                <a16:creationId xmlns:a16="http://schemas.microsoft.com/office/drawing/2014/main" id="{AA99E66B-6C8C-55CA-C8C6-03100C6B39AC}"/>
+              </a:ext>
+            </a:extLst>
+          </p:cNvPr>
+          <p:cNvGrpSpPr/>
+          <p:nvPr/>
+        </p:nvGrpSpPr>
+        <p:grpSpPr>
+          <a:xfrm>
+            <a:off x="0" y="530381"/>
+            <a:ext cx="12192000" cy="5797238"/>
+            <a:chOff x="0" y="530381"/>
+            <a:chExt cx="12192000" cy="5797238"/>
+          </a:xfrm>
+        </p:grpSpPr>
+        <p:pic>
+          <p:nvPicPr>
+            <p:cNvPr id="5" name="Picture 4">
+              <a:extLst>
+                <a:ext uri="{FF2B5EF4-FFF2-40B4-BE49-F238E27FC236}">
+                  <a16:creationId xmlns:a16="http://schemas.microsoft.com/office/drawing/2014/main" id="{6481BCB6-09CE-FE94-E395-FC67BE936F4E}"/>
+                </a:ext>
+              </a:extLst>
+            </p:cNvPr>
+            <p:cNvPicPr>
+              <a:picLocks noChangeAspect="1"/>
+            </p:cNvPicPr>
+            <p:nvPr/>
+          </p:nvPicPr>
+          <p:blipFill>
+            <a:blip r:embed="rId2"/>
+            <a:stretch>
+              <a:fillRect/>
+            </a:stretch>
+          </p:blipFill>
+          <p:spPr>
+            <a:xfrm>
+              <a:off x="0" y="530381"/>
+              <a:ext cx="12192000" cy="5797238"/>
+            </a:xfrm>
+            <a:prstGeom prst="rect">
+              <a:avLst/>
+            </a:prstGeom>
+          </p:spPr>
+        </p:pic>
+        <p:sp>
+          <p:nvSpPr>
+            <p:cNvPr id="6" name="Rectangle 5">
+              <a:extLst>
+                <a:ext uri="{FF2B5EF4-FFF2-40B4-BE49-F238E27FC236}">
+                  <a16:creationId xmlns:a16="http://schemas.microsoft.com/office/drawing/2014/main" id="{EEE2416C-7B17-381E-2EDC-081F8293B8EF}"/>
+                </a:ext>
+              </a:extLst>
+            </p:cNvPr>
+            <p:cNvSpPr/>
+            <p:nvPr/>
+          </p:nvSpPr>
+          <p:spPr>
+            <a:xfrm>
+              <a:off x="10177271" y="960716"/>
+              <a:ext cx="1870041" cy="5366903"/>
+            </a:xfrm>
+            <a:prstGeom prst="rect">
+              <a:avLst/>
+            </a:prstGeom>
+            <a:noFill/>
+            <a:ln w="28575">
+              <a:solidFill>
+                <a:srgbClr val="FF0000"/>
+              </a:solidFill>
+            </a:ln>
+          </p:spPr>
+          <p:style>
+            <a:lnRef idx="2">
+              <a:schemeClr val="accent1">
+                <a:shade val="15000"/>
+              </a:schemeClr>
+            </a:lnRef>
+            <a:fillRef idx="1">
+              <a:schemeClr val="accent1"/>
+            </a:fillRef>
+            <a:effectRef idx="0">
+              <a:schemeClr val="accent1"/>
+            </a:effectRef>
+            <a:fontRef idx="minor">
+              <a:schemeClr val="lt1"/>
+            </a:fontRef>
+          </p:style>
+          <p:txBody>
+            <a:bodyPr rtlCol="0" anchor="ctr"/>
+            <a:lstStyle/>
+            <a:p>
+              <a:pPr algn="ctr"/>
+              <a:endParaRPr lang="en-US"/>
+            </a:p>
+          </p:txBody>
+        </p:sp>
+      </p:grpSp>
     </p:spTree>
     <p:extLst>
       <p:ext uri="{BB962C8B-B14F-4D97-AF65-F5344CB8AC3E}">
@@ -7502,56 +7555,109 @@
           <a:chExt cx="0" cy="0"/>
         </a:xfrm>
       </p:grpSpPr>
-      <p:sp>
-        <p:nvSpPr>
-          <p:cNvPr id="2" name="Title 1">
-            <a:extLst>
-              <a:ext uri="{FF2B5EF4-FFF2-40B4-BE49-F238E27FC236}">
-                <a16:creationId xmlns:a16="http://schemas.microsoft.com/office/drawing/2014/main" id="{2AE16366-2B7A-B03E-7529-B032A215B1DE}"/>
-              </a:ext>
-            </a:extLst>
-          </p:cNvPr>
-          <p:cNvSpPr>
-            <a:spLocks noGrp="1"/>
-          </p:cNvSpPr>
-          <p:nvPr>
-            <p:ph type="title"/>
-          </p:nvPr>
-        </p:nvSpPr>
-        <p:spPr/>
-        <p:txBody>
-          <a:bodyPr/>
-          <a:lstStyle/>
-          <a:p>
-            <a:endParaRPr lang="en-US"/>
-          </a:p>
-        </p:txBody>
-      </p:sp>
-      <p:sp>
-        <p:nvSpPr>
-          <p:cNvPr id="3" name="Content Placeholder 2">
-            <a:extLst>
-              <a:ext uri="{FF2B5EF4-FFF2-40B4-BE49-F238E27FC236}">
-                <a16:creationId xmlns:a16="http://schemas.microsoft.com/office/drawing/2014/main" id="{70C3D35D-6D1F-73DA-9F52-46F0A0B6A6E1}"/>
-              </a:ext>
-            </a:extLst>
-          </p:cNvPr>
-          <p:cNvSpPr>
-            <a:spLocks noGrp="1"/>
-          </p:cNvSpPr>
-          <p:nvPr>
-            <p:ph idx="1"/>
-          </p:nvPr>
-        </p:nvSpPr>
-        <p:spPr/>
-        <p:txBody>
-          <a:bodyPr/>
-          <a:lstStyle/>
-          <a:p>
-            <a:endParaRPr lang="en-US"/>
-          </a:p>
-        </p:txBody>
-      </p:sp>
+      <p:grpSp>
+        <p:nvGrpSpPr>
+          <p:cNvPr id="4" name="Group 3">
+            <a:extLst>
+              <a:ext uri="{FF2B5EF4-FFF2-40B4-BE49-F238E27FC236}">
+                <a16:creationId xmlns:a16="http://schemas.microsoft.com/office/drawing/2014/main" id="{01DF5F06-428B-CD4E-97DF-3F9C59B3B036}"/>
+              </a:ext>
+            </a:extLst>
+          </p:cNvPr>
+          <p:cNvGrpSpPr/>
+          <p:nvPr/>
+        </p:nvGrpSpPr>
+        <p:grpSpPr>
+          <a:xfrm>
+            <a:off x="0" y="445071"/>
+            <a:ext cx="12192000" cy="5787864"/>
+            <a:chOff x="0" y="445071"/>
+            <a:chExt cx="12192000" cy="5787864"/>
+          </a:xfrm>
+        </p:grpSpPr>
+        <p:pic>
+          <p:nvPicPr>
+            <p:cNvPr id="3" name="Picture 2">
+              <a:extLst>
+                <a:ext uri="{FF2B5EF4-FFF2-40B4-BE49-F238E27FC236}">
+                  <a16:creationId xmlns:a16="http://schemas.microsoft.com/office/drawing/2014/main" id="{166EE64E-F432-0A8F-794A-F629704B13DC}"/>
+                </a:ext>
+              </a:extLst>
+            </p:cNvPr>
+            <p:cNvPicPr>
+              <a:picLocks noChangeAspect="1"/>
+            </p:cNvPicPr>
+            <p:nvPr/>
+          </p:nvPicPr>
+          <p:blipFill>
+            <a:blip r:embed="rId2"/>
+            <a:stretch>
+              <a:fillRect/>
+            </a:stretch>
+          </p:blipFill>
+          <p:spPr>
+            <a:xfrm>
+              <a:off x="0" y="445071"/>
+              <a:ext cx="12192000" cy="5787864"/>
+            </a:xfrm>
+            <a:prstGeom prst="rect">
+              <a:avLst/>
+            </a:prstGeom>
+          </p:spPr>
+        </p:pic>
+        <p:sp>
+          <p:nvSpPr>
+            <p:cNvPr id="6" name="Rectangle 5">
+              <a:extLst>
+                <a:ext uri="{FF2B5EF4-FFF2-40B4-BE49-F238E27FC236}">
+                  <a16:creationId xmlns:a16="http://schemas.microsoft.com/office/drawing/2014/main" id="{F0DC9016-AF84-9C0E-D2FD-F3EF483EE391}"/>
+                </a:ext>
+              </a:extLst>
+            </p:cNvPr>
+            <p:cNvSpPr/>
+            <p:nvPr/>
+          </p:nvSpPr>
+          <p:spPr>
+            <a:xfrm>
+              <a:off x="11713463" y="1082165"/>
+              <a:ext cx="352137" cy="444884"/>
+            </a:xfrm>
+            <a:prstGeom prst="rect">
+              <a:avLst/>
+            </a:prstGeom>
+            <a:noFill/>
+            <a:ln w="28575">
+              <a:solidFill>
+                <a:srgbClr val="FF0000"/>
+              </a:solidFill>
+            </a:ln>
+          </p:spPr>
+          <p:style>
+            <a:lnRef idx="2">
+              <a:schemeClr val="accent1">
+                <a:shade val="15000"/>
+              </a:schemeClr>
+            </a:lnRef>
+            <a:fillRef idx="1">
+              <a:schemeClr val="accent1"/>
+            </a:fillRef>
+            <a:effectRef idx="0">
+              <a:schemeClr val="accent1"/>
+            </a:effectRef>
+            <a:fontRef idx="minor">
+              <a:schemeClr val="lt1"/>
+            </a:fontRef>
+          </p:style>
+          <p:txBody>
+            <a:bodyPr rtlCol="0" anchor="ctr"/>
+            <a:lstStyle/>
+            <a:p>
+              <a:pPr algn="ctr"/>
+              <a:endParaRPr lang="en-US"/>
+            </a:p>
+          </p:txBody>
+        </p:sp>
+      </p:grpSp>
     </p:spTree>
     <p:extLst>
       <p:ext uri="{BB962C8B-B14F-4D97-AF65-F5344CB8AC3E}">

</xml_diff>